<commit_message>
Update readme .pptx and .png.
</commit_message>
<xml_diff>
--- a/readme/Bluey.pptx
+++ b/readme/Bluey.pptx
@@ -115,7 +115,7 @@
 <file path=ppt/revisionInfo.xml><?xml version="1.0" encoding="utf-8"?>
 <p1510:revInfo xmlns:a="http://schemas.openxmlformats.org/drawingml/2006/main" xmlns:r="http://schemas.openxmlformats.org/officeDocument/2006/relationships" xmlns:p1510="http://schemas.microsoft.com/office/powerpoint/2015/10/main">
   <p1510:revLst>
-    <p1510:client id="{85C9F3AE-B9FC-42DB-91E8-88F52EC13C97}" v="208" dt="2024-12-21T18:29:43.036"/>
+    <p1510:client id="{85C9F3AE-B9FC-42DB-91E8-88F52EC13C97}" v="210" dt="2024-12-29T19:23:26.353"/>
   </p1510:revLst>
 </p1510:revInfo>
 </file>
@@ -125,42 +125,18 @@
   <pc:docChgLst>
     <pc:chgData name="Sotirios Diamantis" userId="099c4570-4993-40e3-bdd0-3ca4b5a750da" providerId="ADAL" clId="{85C9F3AE-B9FC-42DB-91E8-88F52EC13C97}"/>
     <pc:docChg chg="undo custSel modSld modMainMaster">
-      <pc:chgData name="Sotirios Diamantis" userId="099c4570-4993-40e3-bdd0-3ca4b5a750da" providerId="ADAL" clId="{85C9F3AE-B9FC-42DB-91E8-88F52EC13C97}" dt="2024-12-21T18:29:43.035" v="463"/>
+      <pc:chgData name="Sotirios Diamantis" userId="099c4570-4993-40e3-bdd0-3ca4b5a750da" providerId="ADAL" clId="{85C9F3AE-B9FC-42DB-91E8-88F52EC13C97}" dt="2024-12-29T19:28:22.410" v="816" actId="1076"/>
       <pc:docMkLst>
         <pc:docMk/>
       </pc:docMkLst>
       <pc:sldChg chg="addSp delSp modSp mod setBg">
-        <pc:chgData name="Sotirios Diamantis" userId="099c4570-4993-40e3-bdd0-3ca4b5a750da" providerId="ADAL" clId="{85C9F3AE-B9FC-42DB-91E8-88F52EC13C97}" dt="2024-12-21T18:29:43.035" v="463"/>
+        <pc:chgData name="Sotirios Diamantis" userId="099c4570-4993-40e3-bdd0-3ca4b5a750da" providerId="ADAL" clId="{85C9F3AE-B9FC-42DB-91E8-88F52EC13C97}" dt="2024-12-29T19:28:22.410" v="816" actId="1076"/>
         <pc:sldMkLst>
           <pc:docMk/>
           <pc:sldMk cId="200224226" sldId="256"/>
         </pc:sldMkLst>
-        <pc:spChg chg="del">
-          <ac:chgData name="Sotirios Diamantis" userId="099c4570-4993-40e3-bdd0-3ca4b5a750da" providerId="ADAL" clId="{85C9F3AE-B9FC-42DB-91E8-88F52EC13C97}" dt="2024-12-21T15:24:59.614" v="0" actId="478"/>
-          <ac:spMkLst>
-            <pc:docMk/>
-            <pc:sldMk cId="200224226" sldId="256"/>
-            <ac:spMk id="2" creationId="{92EF2566-C5FA-6253-8D5B-F616E108B4E4}"/>
-          </ac:spMkLst>
-        </pc:spChg>
-        <pc:spChg chg="del">
-          <ac:chgData name="Sotirios Diamantis" userId="099c4570-4993-40e3-bdd0-3ca4b5a750da" providerId="ADAL" clId="{85C9F3AE-B9FC-42DB-91E8-88F52EC13C97}" dt="2024-12-21T15:25:01.044" v="1" actId="478"/>
-          <ac:spMkLst>
-            <pc:docMk/>
-            <pc:sldMk cId="200224226" sldId="256"/>
-            <ac:spMk id="3" creationId="{E56D0F7C-5C1D-D059-D5B9-D99F5A47C5D9}"/>
-          </ac:spMkLst>
-        </pc:spChg>
-        <pc:spChg chg="del">
-          <ac:chgData name="Sotirios Diamantis" userId="099c4570-4993-40e3-bdd0-3ca4b5a750da" providerId="ADAL" clId="{85C9F3AE-B9FC-42DB-91E8-88F52EC13C97}" dt="2024-12-21T15:25:02.092" v="2" actId="478"/>
-          <ac:spMkLst>
-            <pc:docMk/>
-            <pc:sldMk cId="200224226" sldId="256"/>
-            <ac:spMk id="6" creationId="{890C19D0-F31C-4777-70B3-ED256E5700BD}"/>
-          </ac:spMkLst>
-        </pc:spChg>
         <pc:picChg chg="add mod ord">
-          <ac:chgData name="Sotirios Diamantis" userId="099c4570-4993-40e3-bdd0-3ca4b5a750da" providerId="ADAL" clId="{85C9F3AE-B9FC-42DB-91E8-88F52EC13C97}" dt="2024-12-21T18:27:41.184" v="258" actId="1038"/>
+          <ac:chgData name="Sotirios Diamantis" userId="099c4570-4993-40e3-bdd0-3ca4b5a750da" providerId="ADAL" clId="{85C9F3AE-B9FC-42DB-91E8-88F52EC13C97}" dt="2024-12-29T19:18:17.953" v="532" actId="1076"/>
           <ac:picMkLst>
             <pc:docMk/>
             <pc:sldMk cId="200224226" sldId="256"/>
@@ -168,7 +144,7 @@
           </ac:picMkLst>
         </pc:picChg>
         <pc:picChg chg="add mod">
-          <ac:chgData name="Sotirios Diamantis" userId="099c4570-4993-40e3-bdd0-3ca4b5a750da" providerId="ADAL" clId="{85C9F3AE-B9FC-42DB-91E8-88F52EC13C97}" dt="2024-12-21T18:27:41.184" v="258" actId="1038"/>
+          <ac:chgData name="Sotirios Diamantis" userId="099c4570-4993-40e3-bdd0-3ca4b5a750da" providerId="ADAL" clId="{85C9F3AE-B9FC-42DB-91E8-88F52EC13C97}" dt="2024-12-29T19:28:22.410" v="816" actId="1076"/>
           <ac:picMkLst>
             <pc:docMk/>
             <pc:sldMk cId="200224226" sldId="256"/>
@@ -183,6 +159,14 @@
             <ac:picMk id="5" creationId="{D562FE78-C1A6-A384-F47B-4FE2844318F5}"/>
           </ac:picMkLst>
         </pc:picChg>
+        <pc:picChg chg="add del mod">
+          <ac:chgData name="Sotirios Diamantis" userId="099c4570-4993-40e3-bdd0-3ca4b5a750da" providerId="ADAL" clId="{85C9F3AE-B9FC-42DB-91E8-88F52EC13C97}" dt="2024-12-29T19:23:08.893" v="769" actId="478"/>
+          <ac:picMkLst>
+            <pc:docMk/>
+            <pc:sldMk cId="200224226" sldId="256"/>
+            <ac:picMk id="6" creationId="{8A3AA940-7172-4904-FB3A-894D8B4FC3E3}"/>
+          </ac:picMkLst>
+        </pc:picChg>
         <pc:picChg chg="mod">
           <ac:chgData name="Sotirios Diamantis" userId="099c4570-4993-40e3-bdd0-3ca4b5a750da" providerId="ADAL" clId="{85C9F3AE-B9FC-42DB-91E8-88F52EC13C97}" dt="2024-12-21T18:27:56.153" v="313" actId="1038"/>
           <ac:picMkLst>
@@ -191,16 +175,8 @@
             <ac:picMk id="7" creationId="{376A1092-0BA7-D2D1-45B5-9982B23B7C57}"/>
           </ac:picMkLst>
         </pc:picChg>
-        <pc:picChg chg="add del mod ord">
-          <ac:chgData name="Sotirios Diamantis" userId="099c4570-4993-40e3-bdd0-3ca4b5a750da" providerId="ADAL" clId="{85C9F3AE-B9FC-42DB-91E8-88F52EC13C97}" dt="2024-12-21T15:26:48.892" v="14" actId="478"/>
-          <ac:picMkLst>
-            <pc:docMk/>
-            <pc:sldMk cId="200224226" sldId="256"/>
-            <ac:picMk id="8" creationId="{DFCA34F0-10B5-8477-B5BD-ABE98F69BEC3}"/>
-          </ac:picMkLst>
-        </pc:picChg>
         <pc:picChg chg="add mod">
-          <ac:chgData name="Sotirios Diamantis" userId="099c4570-4993-40e3-bdd0-3ca4b5a750da" providerId="ADAL" clId="{85C9F3AE-B9FC-42DB-91E8-88F52EC13C97}" dt="2024-12-21T18:27:41.184" v="258" actId="1038"/>
+          <ac:chgData name="Sotirios Diamantis" userId="099c4570-4993-40e3-bdd0-3ca4b5a750da" providerId="ADAL" clId="{85C9F3AE-B9FC-42DB-91E8-88F52EC13C97}" dt="2024-12-29T19:20:46.762" v="672" actId="1035"/>
           <ac:picMkLst>
             <pc:docMk/>
             <pc:sldMk cId="200224226" sldId="256"/>
@@ -215,12 +191,12 @@
             <ac:picMk id="9" creationId="{6BA9D2AB-337F-7ADE-C96F-41820446CB8A}"/>
           </ac:picMkLst>
         </pc:picChg>
-        <pc:picChg chg="del mod">
-          <ac:chgData name="Sotirios Diamantis" userId="099c4570-4993-40e3-bdd0-3ca4b5a750da" providerId="ADAL" clId="{85C9F3AE-B9FC-42DB-91E8-88F52EC13C97}" dt="2024-12-21T18:02:15.963" v="87" actId="478"/>
+        <pc:picChg chg="add mod">
+          <ac:chgData name="Sotirios Diamantis" userId="099c4570-4993-40e3-bdd0-3ca4b5a750da" providerId="ADAL" clId="{85C9F3AE-B9FC-42DB-91E8-88F52EC13C97}" dt="2024-12-29T19:26:15.232" v="810" actId="1038"/>
           <ac:picMkLst>
             <pc:docMk/>
             <pc:sldMk cId="200224226" sldId="256"/>
-            <ac:picMk id="11" creationId="{BA19F28D-13EA-ABE5-1CD4-4E124AA7D924}"/>
+            <ac:picMk id="11" creationId="{90892F40-CD53-9231-AD43-5702F7AAA799}"/>
           </ac:picMkLst>
         </pc:picChg>
         <pc:picChg chg="add mod">
@@ -229,14 +205,6 @@
             <pc:docMk/>
             <pc:sldMk cId="200224226" sldId="256"/>
             <ac:picMk id="12" creationId="{9234BACE-9C53-B0F9-3076-ED63B126F5CD}"/>
-          </ac:picMkLst>
-        </pc:picChg>
-        <pc:picChg chg="add del mod ord">
-          <ac:chgData name="Sotirios Diamantis" userId="099c4570-4993-40e3-bdd0-3ca4b5a750da" providerId="ADAL" clId="{85C9F3AE-B9FC-42DB-91E8-88F52EC13C97}" dt="2024-12-21T15:28:22.025" v="17" actId="478"/>
-          <ac:picMkLst>
-            <pc:docMk/>
-            <pc:sldMk cId="200224226" sldId="256"/>
-            <ac:picMk id="12" creationId="{D9EB30E2-06C2-6E99-AA6F-6F200E06961E}"/>
           </ac:picMkLst>
         </pc:picChg>
         <pc:picChg chg="add mod">
@@ -497,7 +465,7 @@
           <a:p>
             <a:fld id="{20325ABE-F148-45F5-93C8-3841132B5544}" type="datetimeFigureOut">
               <a:rPr lang="en-CA" smtClean="0"/>
-              <a:t>2024-12-21</a:t>
+              <a:t>2024-12-29</a:t>
             </a:fld>
             <a:endParaRPr lang="en-CA"/>
           </a:p>
@@ -697,7 +665,7 @@
           <a:p>
             <a:fld id="{20325ABE-F148-45F5-93C8-3841132B5544}" type="datetimeFigureOut">
               <a:rPr lang="en-CA" smtClean="0"/>
-              <a:t>2024-12-21</a:t>
+              <a:t>2024-12-29</a:t>
             </a:fld>
             <a:endParaRPr lang="en-CA"/>
           </a:p>
@@ -907,7 +875,7 @@
           <a:p>
             <a:fld id="{20325ABE-F148-45F5-93C8-3841132B5544}" type="datetimeFigureOut">
               <a:rPr lang="en-CA" smtClean="0"/>
-              <a:t>2024-12-21</a:t>
+              <a:t>2024-12-29</a:t>
             </a:fld>
             <a:endParaRPr lang="en-CA"/>
           </a:p>
@@ -1107,7 +1075,7 @@
           <a:p>
             <a:fld id="{20325ABE-F148-45F5-93C8-3841132B5544}" type="datetimeFigureOut">
               <a:rPr lang="en-CA" smtClean="0"/>
-              <a:t>2024-12-21</a:t>
+              <a:t>2024-12-29</a:t>
             </a:fld>
             <a:endParaRPr lang="en-CA"/>
           </a:p>
@@ -1383,7 +1351,7 @@
           <a:p>
             <a:fld id="{20325ABE-F148-45F5-93C8-3841132B5544}" type="datetimeFigureOut">
               <a:rPr lang="en-CA" smtClean="0"/>
-              <a:t>2024-12-21</a:t>
+              <a:t>2024-12-29</a:t>
             </a:fld>
             <a:endParaRPr lang="en-CA"/>
           </a:p>
@@ -1651,7 +1619,7 @@
           <a:p>
             <a:fld id="{20325ABE-F148-45F5-93C8-3841132B5544}" type="datetimeFigureOut">
               <a:rPr lang="en-CA" smtClean="0"/>
-              <a:t>2024-12-21</a:t>
+              <a:t>2024-12-29</a:t>
             </a:fld>
             <a:endParaRPr lang="en-CA"/>
           </a:p>
@@ -2066,7 +2034,7 @@
           <a:p>
             <a:fld id="{20325ABE-F148-45F5-93C8-3841132B5544}" type="datetimeFigureOut">
               <a:rPr lang="en-CA" smtClean="0"/>
-              <a:t>2024-12-21</a:t>
+              <a:t>2024-12-29</a:t>
             </a:fld>
             <a:endParaRPr lang="en-CA"/>
           </a:p>
@@ -2208,7 +2176,7 @@
           <a:p>
             <a:fld id="{20325ABE-F148-45F5-93C8-3841132B5544}" type="datetimeFigureOut">
               <a:rPr lang="en-CA" smtClean="0"/>
-              <a:t>2024-12-21</a:t>
+              <a:t>2024-12-29</a:t>
             </a:fld>
             <a:endParaRPr lang="en-CA"/>
           </a:p>
@@ -2321,7 +2289,7 @@
           <a:p>
             <a:fld id="{20325ABE-F148-45F5-93C8-3841132B5544}" type="datetimeFigureOut">
               <a:rPr lang="en-CA" smtClean="0"/>
-              <a:t>2024-12-21</a:t>
+              <a:t>2024-12-29</a:t>
             </a:fld>
             <a:endParaRPr lang="en-CA"/>
           </a:p>
@@ -2634,7 +2602,7 @@
           <a:p>
             <a:fld id="{20325ABE-F148-45F5-93C8-3841132B5544}" type="datetimeFigureOut">
               <a:rPr lang="en-CA" smtClean="0"/>
-              <a:t>2024-12-21</a:t>
+              <a:t>2024-12-29</a:t>
             </a:fld>
             <a:endParaRPr lang="en-CA"/>
           </a:p>
@@ -2923,7 +2891,7 @@
           <a:p>
             <a:fld id="{20325ABE-F148-45F5-93C8-3841132B5544}" type="datetimeFigureOut">
               <a:rPr lang="en-CA" smtClean="0"/>
-              <a:t>2024-12-21</a:t>
+              <a:t>2024-12-29</a:t>
             </a:fld>
             <a:endParaRPr lang="en-CA"/>
           </a:p>
@@ -3171,7 +3139,7 @@
           <a:p>
             <a:fld id="{20325ABE-F148-45F5-93C8-3841132B5544}" type="datetimeFigureOut">
               <a:rPr lang="en-CA" smtClean="0"/>
-              <a:t>2024-12-21</a:t>
+              <a:t>2024-12-29</a:t>
             </a:fld>
             <a:endParaRPr lang="en-CA"/>
           </a:p>
@@ -3759,8 +3727,8 @@
           </a:stretch>
         </p:blipFill>
         <p:spPr>
-          <a:xfrm rot="19165630">
-            <a:off x="5210948" y="2803355"/>
+          <a:xfrm rot="19748946">
+            <a:off x="5219549" y="2814875"/>
             <a:ext cx="308682" cy="308682"/>
           </a:xfrm>
           <a:prstGeom prst="rect">
@@ -3796,7 +3764,7 @@
         </p:blipFill>
         <p:spPr>
           <a:xfrm>
-            <a:off x="7163444" y="1162947"/>
+            <a:off x="7032367" y="1221056"/>
             <a:ext cx="434741" cy="434741"/>
           </a:xfrm>
           <a:prstGeom prst="rect">
@@ -3870,6 +3838,42 @@
           <a:xfrm>
             <a:off x="6606461" y="2873463"/>
             <a:ext cx="435240" cy="435240"/>
+          </a:xfrm>
+          <a:prstGeom prst="rect">
+            <a:avLst/>
+          </a:prstGeom>
+        </p:spPr>
+      </p:pic>
+      <p:pic>
+        <p:nvPicPr>
+          <p:cNvPr id="11" name="Picture 10" descr="A cartoon bug with a black background&#10;&#10;Description automatically generated">
+            <a:extLst>
+              <a:ext uri="{FF2B5EF4-FFF2-40B4-BE49-F238E27FC236}">
+                <a16:creationId xmlns:a16="http://schemas.microsoft.com/office/drawing/2014/main" id="{90892F40-CD53-9231-AD43-5702F7AAA799}"/>
+              </a:ext>
+            </a:extLst>
+          </p:cNvPr>
+          <p:cNvPicPr>
+            <a:picLocks noChangeAspect="1"/>
+          </p:cNvPicPr>
+          <p:nvPr/>
+        </p:nvPicPr>
+        <p:blipFill>
+          <a:blip r:embed="rId10">
+            <a:extLst>
+              <a:ext uri="{28A0092B-C50C-407E-A947-70E740481C1C}">
+                <a14:useLocalDpi xmlns:a14="http://schemas.microsoft.com/office/drawing/2010/main" val="0"/>
+              </a:ext>
+            </a:extLst>
+          </a:blip>
+          <a:stretch>
+            <a:fillRect/>
+          </a:stretch>
+        </p:blipFill>
+        <p:spPr>
+          <a:xfrm flipH="1">
+            <a:off x="4233620" y="3531136"/>
+            <a:ext cx="820159" cy="820159"/>
           </a:xfrm>
           <a:prstGeom prst="rect">
             <a:avLst/>

</xml_diff>